<commit_message>
Add mobile responsive design
- Add hamburger menu and mobile navigation
- Sidebar slides in/out on mobile with backdrop overlay
- Responsive table with reduced padding on mobile
- Touch-friendly buttons with min 44px height
- Mobile header bar with menu button
- Responsive margins and padding throughout
- Table cells optimized for mobile screens

Mobile breakpoint: lg (1024px)
- Below 1024px: Hamburger menu, hidden sidebar
- Above 1024px: Fixed sidebar always visible

🤖 Generated with [Claude Code](https://claude.com/claude-code)

Co-Authored-By: Claude <noreply@anthropic.com>
</commit_message>
<xml_diff>
--- a/templates/licence_template.pptx
+++ b/templates/licence_template.pptx
@@ -38,6 +38,7 @@
     <p:embeddedFont>
       <p:font typeface="Montserrat ExtraBold" panose="00000900000000000000" pitchFamily="2" charset="0"/>
       <p:bold r:id="rId13"/>
+      <p:boldItalic r:id="rId14"/>
     </p:embeddedFont>
   </p:embeddedFontLst>
   <p:defaultTextStyle>
@@ -3578,7 +3579,7 @@
         </p:nvSpPr>
         <p:spPr>
           <a:xfrm>
-            <a:off x="-3666" y="4974676"/>
+            <a:off x="-14664" y="4968569"/>
             <a:ext cx="7567332" cy="537845"/>
           </a:xfrm>
           <a:prstGeom prst="rect">
@@ -3655,7 +3656,7 @@
         </p:nvGrpSpPr>
         <p:grpSpPr>
           <a:xfrm>
-            <a:off x="1126798" y="6654412"/>
+            <a:off x="1308789" y="6577358"/>
             <a:ext cx="4927757" cy="1117736"/>
             <a:chOff x="0" y="0"/>
             <a:chExt cx="1586220" cy="359794"/>
@@ -3757,9 +3758,9 @@
         <p:grpSpPr>
           <a:xfrm>
             <a:off x="-7332" y="6660568"/>
-            <a:ext cx="7560000" cy="961426"/>
+            <a:ext cx="7567332" cy="922868"/>
             <a:chOff x="0" y="-9525"/>
-            <a:chExt cx="10080000" cy="1281901"/>
+            <a:chExt cx="10089776" cy="1230491"/>
           </a:xfrm>
         </p:grpSpPr>
         <p:sp>
@@ -3854,7 +3855,7 @@
           </p:nvSpPr>
           <p:spPr>
             <a:xfrm>
-              <a:off x="0" y="900479"/>
+              <a:off x="9776" y="849069"/>
               <a:ext cx="10080000" cy="371897"/>
             </a:xfrm>
             <a:prstGeom prst="rect">
@@ -4315,7 +4316,7 @@
         </p:nvSpPr>
         <p:spPr>
           <a:xfrm>
-            <a:off x="0" y="5561491"/>
+            <a:off x="-14664" y="5563464"/>
             <a:ext cx="7560000" cy="179536"/>
           </a:xfrm>
           <a:prstGeom prst="rect">
@@ -6915,6 +6916,15 @@
 </file>
 
 <file path=customXml/item1.xml><?xml version="1.0" encoding="utf-8"?>
+<?mso-contentType ?>
+<FormTemplates xmlns="http://schemas.microsoft.com/sharepoint/v3/contenttype/forms">
+  <Display>DocumentLibraryForm</Display>
+  <Edit>DocumentLibraryForm</Edit>
+  <New>DocumentLibraryForm</New>
+</FormTemplates>
+</file>
+
+<file path=customXml/item2.xml><?xml version="1.0" encoding="utf-8"?>
 <p:properties xmlns:p="http://schemas.microsoft.com/office/2006/metadata/properties" xmlns:xsi="http://www.w3.org/2001/XMLSchema-instance" xmlns:pc="http://schemas.microsoft.com/office/infopath/2007/PartnerControls">
   <documentManagement>
     <lcf76f155ced4ddcb4097134ff3c332f xmlns="87914090-f47f-4121-974f-227c293cedfc">
@@ -6923,15 +6933,6 @@
     <TaxCatchAll xmlns="9687b71e-b521-48d9-b284-3585a3129616" xsi:nil="true"/>
   </documentManagement>
 </p:properties>
-</file>
-
-<file path=customXml/item2.xml><?xml version="1.0" encoding="utf-8"?>
-<?mso-contentType ?>
-<FormTemplates xmlns="http://schemas.microsoft.com/sharepoint/v3/contenttype/forms">
-  <Display>DocumentLibraryForm</Display>
-  <Edit>DocumentLibraryForm</Edit>
-  <New>DocumentLibraryForm</New>
-</FormTemplates>
 </file>
 
 <file path=customXml/item3.xml><?xml version="1.0" encoding="utf-8"?>
@@ -7176,6 +7177,14 @@
 </file>
 
 <file path=customXml/itemProps1.xml><?xml version="1.0" encoding="utf-8"?>
+<ds:datastoreItem xmlns:ds="http://schemas.openxmlformats.org/officeDocument/2006/customXml" ds:itemID="{30F2028B-6345-43DF-9AFB-ABCC2035AF04}">
+  <ds:schemaRefs>
+    <ds:schemaRef ds:uri="http://schemas.microsoft.com/sharepoint/v3/contenttype/forms"/>
+  </ds:schemaRefs>
+</ds:datastoreItem>
+</file>
+
+<file path=customXml/itemProps2.xml><?xml version="1.0" encoding="utf-8"?>
 <ds:datastoreItem xmlns:ds="http://schemas.openxmlformats.org/officeDocument/2006/customXml" ds:itemID="{E0FC3157-8B69-4F01-B5E8-3D1EDEC87D66}">
   <ds:schemaRefs>
     <ds:schemaRef ds:uri="87914090-f47f-4121-974f-227c293cedfc"/>
@@ -7188,14 +7197,6 @@
     <ds:schemaRef ds:uri="http://schemas.microsoft.com/office/infopath/2007/PartnerControls"/>
     <ds:schemaRef ds:uri="http://schemas.openxmlformats.org/package/2006/metadata/core-properties"/>
     <ds:schemaRef ds:uri="http://www.w3.org/XML/1998/namespace"/>
-  </ds:schemaRefs>
-</ds:datastoreItem>
-</file>
-
-<file path=customXml/itemProps2.xml><?xml version="1.0" encoding="utf-8"?>
-<ds:datastoreItem xmlns:ds="http://schemas.openxmlformats.org/officeDocument/2006/customXml" ds:itemID="{30F2028B-6345-43DF-9AFB-ABCC2035AF04}">
-  <ds:schemaRefs>
-    <ds:schemaRef ds:uri="http://schemas.microsoft.com/sharepoint/v3/contenttype/forms"/>
   </ds:schemaRefs>
 </ds:datastoreItem>
 </file>

</xml_diff>